<commit_message>
tdf#125563 Adapt adjustment values to binary shape geometry
All presetTextWarp shapes are mapped to MS binary WordArt geometry in
current implementation. But they use different reference systems for
coordinates and different unit for angles. So _all_ adjustment values
have to be adapted. Error was, that only angles were treated.
Correct test file to actually contain the claimed 213.25 degree.
Other bugs than adjustment values will be addressed in separate issues.

Change-Id: I719b364af23887e50f003cf9878665755b8989ae
Reviewed-on: https://gerrit.libreoffice.org/73624
Tested-by: Jenkins
Reviewed-by: Regina Henschel <rb.henschel@t-online.de>
</commit_message>
<xml_diff>
--- a/sd/qa/unit/data/pptx/tdf116350-texteffects.pptx
+++ b/sd/qa/unit/data/pptx/tdf116350-texteffects.pptx
@@ -259,7 +259,7 @@
           <a:p>
             <a:fld id="{032C10C7-D4A2-4193-B2D8-0669A6677999}" type="datetimeFigureOut">
               <a:rPr lang="pl-PL" smtClean="0"/>
-              <a:t>31.07.2018</a:t>
+              <a:t>06.06.2019</a:t>
             </a:fld>
             <a:endParaRPr lang="pl-PL"/>
           </a:p>
@@ -457,7 +457,7 @@
           <a:p>
             <a:fld id="{032C10C7-D4A2-4193-B2D8-0669A6677999}" type="datetimeFigureOut">
               <a:rPr lang="pl-PL" smtClean="0"/>
-              <a:t>31.07.2018</a:t>
+              <a:t>06.06.2019</a:t>
             </a:fld>
             <a:endParaRPr lang="pl-PL"/>
           </a:p>
@@ -665,7 +665,7 @@
           <a:p>
             <a:fld id="{032C10C7-D4A2-4193-B2D8-0669A6677999}" type="datetimeFigureOut">
               <a:rPr lang="pl-PL" smtClean="0"/>
-              <a:t>31.07.2018</a:t>
+              <a:t>06.06.2019</a:t>
             </a:fld>
             <a:endParaRPr lang="pl-PL"/>
           </a:p>
@@ -863,7 +863,7 @@
           <a:p>
             <a:fld id="{032C10C7-D4A2-4193-B2D8-0669A6677999}" type="datetimeFigureOut">
               <a:rPr lang="pl-PL" smtClean="0"/>
-              <a:t>31.07.2018</a:t>
+              <a:t>06.06.2019</a:t>
             </a:fld>
             <a:endParaRPr lang="pl-PL"/>
           </a:p>
@@ -1138,7 +1138,7 @@
           <a:p>
             <a:fld id="{032C10C7-D4A2-4193-B2D8-0669A6677999}" type="datetimeFigureOut">
               <a:rPr lang="pl-PL" smtClean="0"/>
-              <a:t>31.07.2018</a:t>
+              <a:t>06.06.2019</a:t>
             </a:fld>
             <a:endParaRPr lang="pl-PL"/>
           </a:p>
@@ -1403,7 +1403,7 @@
           <a:p>
             <a:fld id="{032C10C7-D4A2-4193-B2D8-0669A6677999}" type="datetimeFigureOut">
               <a:rPr lang="pl-PL" smtClean="0"/>
-              <a:t>31.07.2018</a:t>
+              <a:t>06.06.2019</a:t>
             </a:fld>
             <a:endParaRPr lang="pl-PL"/>
           </a:p>
@@ -1815,7 +1815,7 @@
           <a:p>
             <a:fld id="{032C10C7-D4A2-4193-B2D8-0669A6677999}" type="datetimeFigureOut">
               <a:rPr lang="pl-PL" smtClean="0"/>
-              <a:t>31.07.2018</a:t>
+              <a:t>06.06.2019</a:t>
             </a:fld>
             <a:endParaRPr lang="pl-PL"/>
           </a:p>
@@ -1956,7 +1956,7 @@
           <a:p>
             <a:fld id="{032C10C7-D4A2-4193-B2D8-0669A6677999}" type="datetimeFigureOut">
               <a:rPr lang="pl-PL" smtClean="0"/>
-              <a:t>31.07.2018</a:t>
+              <a:t>06.06.2019</a:t>
             </a:fld>
             <a:endParaRPr lang="pl-PL"/>
           </a:p>
@@ -2069,7 +2069,7 @@
           <a:p>
             <a:fld id="{032C10C7-D4A2-4193-B2D8-0669A6677999}" type="datetimeFigureOut">
               <a:rPr lang="pl-PL" smtClean="0"/>
-              <a:t>31.07.2018</a:t>
+              <a:t>06.06.2019</a:t>
             </a:fld>
             <a:endParaRPr lang="pl-PL"/>
           </a:p>
@@ -2380,7 +2380,7 @@
           <a:p>
             <a:fld id="{032C10C7-D4A2-4193-B2D8-0669A6677999}" type="datetimeFigureOut">
               <a:rPr lang="pl-PL" smtClean="0"/>
-              <a:t>31.07.2018</a:t>
+              <a:t>06.06.2019</a:t>
             </a:fld>
             <a:endParaRPr lang="pl-PL"/>
           </a:p>
@@ -2668,7 +2668,7 @@
           <a:p>
             <a:fld id="{032C10C7-D4A2-4193-B2D8-0669A6677999}" type="datetimeFigureOut">
               <a:rPr lang="pl-PL" smtClean="0"/>
-              <a:t>31.07.2018</a:t>
+              <a:t>06.06.2019</a:t>
             </a:fld>
             <a:endParaRPr lang="pl-PL"/>
           </a:p>
@@ -2909,7 +2909,7 @@
           <a:p>
             <a:fld id="{032C10C7-D4A2-4193-B2D8-0669A6677999}" type="datetimeFigureOut">
               <a:rPr lang="pl-PL" smtClean="0"/>
-              <a:t>31.07.2018</a:t>
+              <a:t>06.06.2019</a:t>
             </a:fld>
             <a:endParaRPr lang="pl-PL"/>
           </a:p>
@@ -3391,7 +3391,7 @@
           <a:bodyPr wrap="square" rtlCol="0">
             <a:prstTxWarp prst="textArchUp">
               <a:avLst>
-                <a:gd name="adj" fmla="val 12795363"/>
+                <a:gd name="adj" fmla="val 12795000"/>
               </a:avLst>
             </a:prstTxWarp>
             <a:spAutoFit/>

</xml_diff>